<commit_message>
add write-up and fixed typos
</commit_message>
<xml_diff>
--- a/Suicides Among Veterans in the United States.pptx
+++ b/Suicides Among Veterans in the United States.pptx
@@ -228,7 +228,7 @@
           <a:effectLst/>
           <a:extLst>
             <a:ext uri="{91240B29-F687-4f45-9708-019B960494DF}">
-              <a14:hiddenLine xmlns="" xmlns:a14="http://schemas.microsoft.com/office/drawing/2010/main" w="9525">
+              <a14:hiddenLine xmlns:a14="http://schemas.microsoft.com/office/drawing/2010/main" xmlns="" w="9525">
                 <a:solidFill>
                   <a:srgbClr val="000000"/>
                 </a:solidFill>
@@ -1750,7 +1750,7 @@
           <a:ln/>
           <a:extLst>
             <a:ext uri="{91240B29-F687-4f45-9708-019B960494DF}">
-              <a14:hiddenLine xmlns="" xmlns:a14="http://schemas.microsoft.com/office/drawing/2010/main" w="9525">
+              <a14:hiddenLine xmlns:a14="http://schemas.microsoft.com/office/drawing/2010/main" xmlns="" w="9525">
                 <a:solidFill>
                   <a:srgbClr val="000000"/>
                 </a:solidFill>
@@ -2025,7 +2025,7 @@
           <a:ln/>
           <a:extLst>
             <a:ext uri="{91240B29-F687-4f45-9708-019B960494DF}">
-              <a14:hiddenLine xmlns="" xmlns:a14="http://schemas.microsoft.com/office/drawing/2010/main" w="9525">
+              <a14:hiddenLine xmlns:a14="http://schemas.microsoft.com/office/drawing/2010/main" xmlns="" w="9525">
                 <a:solidFill>
                   <a:srgbClr val="000000"/>
                 </a:solidFill>
@@ -2308,7 +2308,7 @@
           <a:ln/>
           <a:extLst>
             <a:ext uri="{91240B29-F687-4f45-9708-019B960494DF}">
-              <a14:hiddenLine xmlns="" xmlns:a14="http://schemas.microsoft.com/office/drawing/2010/main" w="9525">
+              <a14:hiddenLine xmlns:a14="http://schemas.microsoft.com/office/drawing/2010/main" xmlns="" w="9525">
                 <a:solidFill>
                   <a:srgbClr val="000000"/>
                 </a:solidFill>
@@ -2934,7 +2934,7 @@
           <a:ln/>
           <a:extLst>
             <a:ext uri="{91240B29-F687-4f45-9708-019B960494DF}">
-              <a14:hiddenLine xmlns="" xmlns:a14="http://schemas.microsoft.com/office/drawing/2010/main" w="9525">
+              <a14:hiddenLine xmlns:a14="http://schemas.microsoft.com/office/drawing/2010/main" xmlns="" w="9525">
                 <a:solidFill>
                   <a:srgbClr val="000000"/>
                 </a:solidFill>
@@ -3273,7 +3273,7 @@
           <a:ln/>
           <a:extLst>
             <a:ext uri="{91240B29-F687-4f45-9708-019B960494DF}">
-              <a14:hiddenLine xmlns="" xmlns:a14="http://schemas.microsoft.com/office/drawing/2010/main" w="9525">
+              <a14:hiddenLine xmlns:a14="http://schemas.microsoft.com/office/drawing/2010/main" xmlns="" w="9525">
                 <a:solidFill>
                   <a:srgbClr val="000000"/>
                 </a:solidFill>
@@ -3750,7 +3750,7 @@
           <a:ln/>
           <a:extLst>
             <a:ext uri="{91240B29-F687-4f45-9708-019B960494DF}">
-              <a14:hiddenLine xmlns="" xmlns:a14="http://schemas.microsoft.com/office/drawing/2010/main" w="9525">
+              <a14:hiddenLine xmlns:a14="http://schemas.microsoft.com/office/drawing/2010/main" xmlns="" w="9525">
                 <a:solidFill>
                   <a:srgbClr val="000000"/>
                 </a:solidFill>
@@ -4179,7 +4179,7 @@
           <a:ln/>
           <a:extLst>
             <a:ext uri="{91240B29-F687-4f45-9708-019B960494DF}">
-              <a14:hiddenLine xmlns="" xmlns:a14="http://schemas.microsoft.com/office/drawing/2010/main" w="9525">
+              <a14:hiddenLine xmlns:a14="http://schemas.microsoft.com/office/drawing/2010/main" xmlns="" w="9525">
                 <a:solidFill>
                   <a:srgbClr val="000000"/>
                 </a:solidFill>
@@ -7186,7 +7186,7 @@
           <a:effectLst/>
           <a:extLst>
             <a:ext uri="{91240B29-F687-4f45-9708-019B960494DF}">
-              <a14:hiddenLine xmlns:a14="http://schemas.microsoft.com/office/drawing/2010/main" xmlns:p14="http://schemas.microsoft.com/office/powerpoint/2010/main" xmlns="" w="9525">
+              <a14:hiddenLine xmlns="" xmlns:p14="http://schemas.microsoft.com/office/powerpoint/2010/main" xmlns:a14="http://schemas.microsoft.com/office/drawing/2010/main" w="9525">
                 <a:solidFill>
                   <a:srgbClr val="000000"/>
                 </a:solidFill>
@@ -8255,7 +8255,7 @@
           <a:ln/>
           <a:extLst>
             <a:ext uri="{91240B29-F687-4f45-9708-019B960494DF}">
-              <a14:hiddenLine xmlns:a14="http://schemas.microsoft.com/office/drawing/2010/main" xmlns:p14="http://schemas.microsoft.com/office/powerpoint/2010/main" xmlns="" w="9525">
+              <a14:hiddenLine xmlns="" xmlns:p14="http://schemas.microsoft.com/office/powerpoint/2010/main" xmlns:a14="http://schemas.microsoft.com/office/drawing/2010/main" w="9525">
                 <a:solidFill>
                   <a:srgbClr val="000000"/>
                 </a:solidFill>
@@ -9992,7 +9992,7 @@
           <a:effectLst/>
           <a:extLst>
             <a:ext uri="{91240B29-F687-4f45-9708-019B960494DF}">
-              <a14:hiddenLine xmlns:a14="http://schemas.microsoft.com/office/drawing/2010/main" xmlns:p14="http://schemas.microsoft.com/office/powerpoint/2010/main" xmlns="" w="9525">
+              <a14:hiddenLine xmlns="" xmlns:p14="http://schemas.microsoft.com/office/powerpoint/2010/main" xmlns:a14="http://schemas.microsoft.com/office/drawing/2010/main" w="9525">
                 <a:solidFill>
                   <a:srgbClr val="000000"/>
                 </a:solidFill>
@@ -10450,7 +10450,7 @@
           <a:ln/>
           <a:extLst>
             <a:ext uri="{91240B29-F687-4f45-9708-019B960494DF}">
-              <a14:hiddenLine xmlns:a14="http://schemas.microsoft.com/office/drawing/2010/main" xmlns:p14="http://schemas.microsoft.com/office/powerpoint/2010/main" xmlns="" w="9525">
+              <a14:hiddenLine xmlns="" xmlns:p14="http://schemas.microsoft.com/office/powerpoint/2010/main" xmlns:a14="http://schemas.microsoft.com/office/drawing/2010/main" w="9525">
                 <a:solidFill>
                   <a:srgbClr val="000000"/>
                 </a:solidFill>
@@ -11495,7 +11495,7 @@
             <a:pPr lvl="1"/>
             <a:r>
               <a:rPr lang="en-US" dirty="0"/>
-              <a:t>Opening smaller non-profit clinics in rural parts of those states that have high suicide rates in order to create accessibility for veterans to seek professional help.</a:t>
+              <a:t>Opening smaller low cost/free clinics in rural parts of those states that have high suicide rates in order to create accessibility for veterans to seek professional help.</a:t>
             </a:r>
           </a:p>
           <a:p>
@@ -11612,7 +11612,7 @@
             <a:pPr lvl="1"/>
             <a:r>
               <a:rPr lang="en-US" dirty="0"/>
-              <a:t>Which states have the most veterans’ death due to suicide and what is the total availability of Veteran Affairs (VA) medical centers in the those high risk states?</a:t>
+              <a:t>Which states have the most veterans’ death due to suicide and what is the total availability of Veteran Affairs (VA) medical centers in those high risk states?</a:t>
             </a:r>
           </a:p>
           <a:p>
@@ -13106,7 +13106,7 @@
           <a:effectLst/>
           <a:extLst>
             <a:ext uri="{91240B29-F687-4f45-9708-019B960494DF}">
-              <a14:hiddenLine xmlns:a14="http://schemas.microsoft.com/office/drawing/2010/main" xmlns:p14="http://schemas.microsoft.com/office/powerpoint/2010/main" xmlns="" w="9525">
+              <a14:hiddenLine xmlns="" xmlns:p14="http://schemas.microsoft.com/office/powerpoint/2010/main" xmlns:a14="http://schemas.microsoft.com/office/drawing/2010/main" w="9525">
                 <a:solidFill>
                   <a:srgbClr val="000000"/>
                 </a:solidFill>

</xml_diff>